<commit_message>
tweak to maxcut minflow slides
</commit_message>
<xml_diff>
--- a/slides/Maxcut-Minflow-f21.pptx
+++ b/slides/Maxcut-Minflow-f21.pptx
@@ -6024,229 +6024,6 @@
         </p:cxnSp>
         <p:sp>
           <p:nvSpPr>
-            <p:cNvPr id="27" name="Freeform 26">
-              <a:extLst>
-                <a:ext uri="{FF2B5EF4-FFF2-40B4-BE49-F238E27FC236}">
-                  <a16:creationId xmlns:a16="http://schemas.microsoft.com/office/drawing/2014/main" id="{69D0A784-0B37-8649-81F7-71C8DB3278F4}"/>
-                </a:ext>
-              </a:extLst>
-            </p:cNvPr>
-            <p:cNvSpPr/>
-            <p:nvPr/>
-          </p:nvSpPr>
-          <p:spPr>
-            <a:xfrm>
-              <a:off x="4370266" y="3581400"/>
-              <a:ext cx="201734" cy="1364776"/>
-            </a:xfrm>
-            <a:custGeom>
-              <a:avLst/>
-              <a:gdLst>
-                <a:gd name="connsiteX0" fmla="*/ 77638 w 201734"/>
-                <a:gd name="connsiteY0" fmla="*/ 1364776 h 1364776"/>
-                <a:gd name="connsiteX1" fmla="*/ 200467 w 201734"/>
-                <a:gd name="connsiteY1" fmla="*/ 655093 h 1364776"/>
-                <a:gd name="connsiteX2" fmla="*/ 9399 w 201734"/>
-                <a:gd name="connsiteY2" fmla="*/ 0 h 1364776"/>
-              </a:gdLst>
-              <a:ahLst/>
-              <a:cxnLst>
-                <a:cxn ang="0">
-                  <a:pos x="connsiteX0" y="connsiteY0"/>
-                </a:cxn>
-                <a:cxn ang="0">
-                  <a:pos x="connsiteX1" y="connsiteY1"/>
-                </a:cxn>
-                <a:cxn ang="0">
-                  <a:pos x="connsiteX2" y="connsiteY2"/>
-                </a:cxn>
-              </a:cxnLst>
-              <a:rect l="l" t="t" r="r" b="b"/>
-              <a:pathLst>
-                <a:path w="201734" h="1364776">
-                  <a:moveTo>
-                    <a:pt x="77638" y="1364776"/>
-                  </a:moveTo>
-                  <a:cubicBezTo>
-                    <a:pt x="144739" y="1123666"/>
-                    <a:pt x="211840" y="882556"/>
-                    <a:pt x="200467" y="655093"/>
-                  </a:cubicBezTo>
-                  <a:cubicBezTo>
-                    <a:pt x="189094" y="427630"/>
-                    <a:pt x="-49741" y="9098"/>
-                    <a:pt x="9399" y="0"/>
-                  </a:cubicBezTo>
-                </a:path>
-              </a:pathLst>
-            </a:custGeom>
-            <a:noFill/>
-            <a:ln w="38100">
-              <a:solidFill>
-                <a:schemeClr val="tx1"/>
-              </a:solidFill>
-              <a:headEnd type="triangle" w="med" len="med"/>
-              <a:tailEnd type="none" w="med" len="med"/>
-            </a:ln>
-          </p:spPr>
-          <p:style>
-            <a:lnRef idx="2">
-              <a:schemeClr val="accent1">
-                <a:shade val="50000"/>
-              </a:schemeClr>
-            </a:lnRef>
-            <a:fillRef idx="1">
-              <a:schemeClr val="accent1"/>
-            </a:fillRef>
-            <a:effectRef idx="0">
-              <a:schemeClr val="accent1"/>
-            </a:effectRef>
-            <a:fontRef idx="minor">
-              <a:schemeClr val="lt1"/>
-            </a:fontRef>
-          </p:style>
-          <p:txBody>
-            <a:bodyPr rtlCol="0" anchor="ctr"/>
-            <a:lstStyle/>
-            <a:p>
-              <a:pPr algn="ctr"/>
-              <a:endParaRPr lang="en-US"/>
-            </a:p>
-          </p:txBody>
-        </p:sp>
-        <p:sp>
-          <p:nvSpPr>
-            <p:cNvPr id="28" name="Freeform 27">
-              <a:extLst>
-                <a:ext uri="{FF2B5EF4-FFF2-40B4-BE49-F238E27FC236}">
-                  <a16:creationId xmlns:a16="http://schemas.microsoft.com/office/drawing/2014/main" id="{B9320117-5514-294F-BD1C-CE9C46FA800A}"/>
-                </a:ext>
-              </a:extLst>
-            </p:cNvPr>
-            <p:cNvSpPr/>
-            <p:nvPr/>
-          </p:nvSpPr>
-          <p:spPr>
-            <a:xfrm>
-              <a:off x="1190445" y="4093962"/>
-              <a:ext cx="1293963" cy="1064634"/>
-            </a:xfrm>
-            <a:custGeom>
-              <a:avLst/>
-              <a:gdLst>
-                <a:gd name="connsiteX0" fmla="*/ 1293963 w 1293963"/>
-                <a:gd name="connsiteY0" fmla="*/ 1064634 h 1064634"/>
-                <a:gd name="connsiteX1" fmla="*/ 362310 w 1293963"/>
-                <a:gd name="connsiteY1" fmla="*/ 710951 h 1064634"/>
-                <a:gd name="connsiteX2" fmla="*/ 0 w 1293963"/>
-                <a:gd name="connsiteY2" fmla="*/ 3585 h 1064634"/>
-              </a:gdLst>
-              <a:ahLst/>
-              <a:cxnLst>
-                <a:cxn ang="0">
-                  <a:pos x="connsiteX0" y="connsiteY0"/>
-                </a:cxn>
-                <a:cxn ang="0">
-                  <a:pos x="connsiteX1" y="connsiteY1"/>
-                </a:cxn>
-                <a:cxn ang="0">
-                  <a:pos x="connsiteX2" y="connsiteY2"/>
-                </a:cxn>
-              </a:cxnLst>
-              <a:rect l="l" t="t" r="r" b="b"/>
-              <a:pathLst>
-                <a:path w="1293963" h="1064634">
-                  <a:moveTo>
-                    <a:pt x="1293963" y="1064634"/>
-                  </a:moveTo>
-                  <a:cubicBezTo>
-                    <a:pt x="935966" y="976213"/>
-                    <a:pt x="577970" y="887792"/>
-                    <a:pt x="362310" y="710951"/>
-                  </a:cubicBezTo>
-                  <a:cubicBezTo>
-                    <a:pt x="146650" y="534110"/>
-                    <a:pt x="24441" y="-51049"/>
-                    <a:pt x="0" y="3585"/>
-                  </a:cubicBezTo>
-                </a:path>
-              </a:pathLst>
-            </a:custGeom>
-            <a:noFill/>
-            <a:ln w="38100">
-              <a:solidFill>
-                <a:schemeClr val="tx1"/>
-              </a:solidFill>
-              <a:headEnd type="none" w="med" len="med"/>
-              <a:tailEnd type="triangle" w="med" len="med"/>
-            </a:ln>
-          </p:spPr>
-          <p:style>
-            <a:lnRef idx="2">
-              <a:schemeClr val="accent1">
-                <a:shade val="50000"/>
-              </a:schemeClr>
-            </a:lnRef>
-            <a:fillRef idx="1">
-              <a:schemeClr val="accent1"/>
-            </a:fillRef>
-            <a:effectRef idx="0">
-              <a:schemeClr val="accent1"/>
-            </a:effectRef>
-            <a:fontRef idx="minor">
-              <a:schemeClr val="lt1"/>
-            </a:fontRef>
-          </p:style>
-          <p:txBody>
-            <a:bodyPr rtlCol="0" anchor="ctr"/>
-            <a:lstStyle/>
-            <a:p>
-              <a:pPr algn="ctr"/>
-              <a:endParaRPr lang="en-US"/>
-            </a:p>
-          </p:txBody>
-        </p:sp>
-        <p:sp>
-          <p:nvSpPr>
-            <p:cNvPr id="29" name="TextBox 28">
-              <a:extLst>
-                <a:ext uri="{FF2B5EF4-FFF2-40B4-BE49-F238E27FC236}">
-                  <a16:creationId xmlns:a16="http://schemas.microsoft.com/office/drawing/2014/main" id="{709E5FD4-820B-EE44-87CE-B289935C14CD}"/>
-                </a:ext>
-              </a:extLst>
-            </p:cNvPr>
-            <p:cNvSpPr txBox="1"/>
-            <p:nvPr/>
-          </p:nvSpPr>
-          <p:spPr>
-            <a:xfrm>
-              <a:off x="1371600" y="4724400"/>
-              <a:ext cx="339228" cy="415292"/>
-            </a:xfrm>
-            <a:prstGeom prst="rect">
-              <a:avLst/>
-            </a:prstGeom>
-            <a:noFill/>
-          </p:spPr>
-          <p:txBody>
-            <a:bodyPr wrap="none" rtlCol="0">
-              <a:spAutoFit/>
-            </a:bodyPr>
-            <a:lstStyle/>
-            <a:p>
-              <a:r>
-                <a:rPr lang="en-US" dirty="0">
-                  <a:solidFill>
-                    <a:srgbClr val="00B050"/>
-                  </a:solidFill>
-                </a:rPr>
-                <a:t>1</a:t>
-              </a:r>
-            </a:p>
-          </p:txBody>
-        </p:sp>
-        <p:sp>
-          <p:nvSpPr>
             <p:cNvPr id="30" name="TextBox 29">
               <a:extLst>
                 <a:ext uri="{FF2B5EF4-FFF2-40B4-BE49-F238E27FC236}">
@@ -6358,45 +6135,6 @@
                   </a:solidFill>
                 </a:rPr>
                 <a:t>3</a:t>
-              </a:r>
-            </a:p>
-          </p:txBody>
-        </p:sp>
-        <p:sp>
-          <p:nvSpPr>
-            <p:cNvPr id="33" name="TextBox 32">
-              <a:extLst>
-                <a:ext uri="{FF2B5EF4-FFF2-40B4-BE49-F238E27FC236}">
-                  <a16:creationId xmlns:a16="http://schemas.microsoft.com/office/drawing/2014/main" id="{C6116767-49DC-F34F-ABE8-8E83F5A6CC71}"/>
-                </a:ext>
-              </a:extLst>
-            </p:cNvPr>
-            <p:cNvSpPr txBox="1"/>
-            <p:nvPr/>
-          </p:nvSpPr>
-          <p:spPr>
-            <a:xfrm>
-              <a:off x="4572000" y="4069514"/>
-              <a:ext cx="339228" cy="415292"/>
-            </a:xfrm>
-            <a:prstGeom prst="rect">
-              <a:avLst/>
-            </a:prstGeom>
-            <a:noFill/>
-          </p:spPr>
-          <p:txBody>
-            <a:bodyPr wrap="none" rtlCol="0">
-              <a:spAutoFit/>
-            </a:bodyPr>
-            <a:lstStyle/>
-            <a:p>
-              <a:r>
-                <a:rPr lang="en-US" dirty="0">
-                  <a:solidFill>
-                    <a:srgbClr val="00B050"/>
-                  </a:solidFill>
-                </a:rPr>
-                <a:t>2</a:t>
               </a:r>
             </a:p>
           </p:txBody>
@@ -9580,47 +9318,6 @@
             </a:p>
           </p:txBody>
         </p:sp>
-        <p:sp>
-          <p:nvSpPr>
-            <p:cNvPr id="18" name="TextBox 17"/>
-            <p:cNvSpPr txBox="1"/>
-            <p:nvPr/>
-          </p:nvSpPr>
-          <p:spPr>
-            <a:xfrm>
-              <a:off x="1190445" y="4740540"/>
-              <a:ext cx="547870" cy="397948"/>
-            </a:xfrm>
-            <a:prstGeom prst="rect">
-              <a:avLst/>
-            </a:prstGeom>
-            <a:noFill/>
-          </p:spPr>
-          <p:txBody>
-            <a:bodyPr wrap="none" rtlCol="0">
-              <a:spAutoFit/>
-            </a:bodyPr>
-            <a:lstStyle/>
-            <a:p>
-              <a:r>
-                <a:rPr lang="en-US" dirty="0">
-                  <a:solidFill>
-                    <a:srgbClr val="FF0000"/>
-                  </a:solidFill>
-                </a:rPr>
-                <a:t>0/</a:t>
-              </a:r>
-              <a:r>
-                <a:rPr lang="en-US" dirty="0">
-                  <a:solidFill>
-                    <a:srgbClr val="00B050"/>
-                  </a:solidFill>
-                </a:rPr>
-                <a:t>1</a:t>
-              </a:r>
-            </a:p>
-          </p:txBody>
-        </p:sp>
         <p:cxnSp>
           <p:nvCxnSpPr>
             <p:cNvPr id="19" name="Straight Connector 18"/>
@@ -10137,92 +9834,6 @@
               </a:solidFill>
               <a:headEnd type="triangle" w="med" len="med"/>
               <a:tailEnd type="none" w="med" len="med"/>
-            </a:ln>
-          </p:spPr>
-          <p:style>
-            <a:lnRef idx="2">
-              <a:schemeClr val="accent1">
-                <a:shade val="50000"/>
-              </a:schemeClr>
-            </a:lnRef>
-            <a:fillRef idx="1">
-              <a:schemeClr val="accent1"/>
-            </a:fillRef>
-            <a:effectRef idx="0">
-              <a:schemeClr val="accent1"/>
-            </a:effectRef>
-            <a:fontRef idx="minor">
-              <a:schemeClr val="lt1"/>
-            </a:fontRef>
-          </p:style>
-          <p:txBody>
-            <a:bodyPr rtlCol="0" anchor="ctr"/>
-            <a:lstStyle/>
-            <a:p>
-              <a:pPr algn="ctr"/>
-              <a:endParaRPr lang="en-US"/>
-            </a:p>
-          </p:txBody>
-        </p:sp>
-        <p:sp>
-          <p:nvSpPr>
-            <p:cNvPr id="28" name="Freeform 27"/>
-            <p:cNvSpPr/>
-            <p:nvPr/>
-          </p:nvSpPr>
-          <p:spPr>
-            <a:xfrm>
-              <a:off x="1190445" y="4093962"/>
-              <a:ext cx="1293963" cy="1064634"/>
-            </a:xfrm>
-            <a:custGeom>
-              <a:avLst/>
-              <a:gdLst>
-                <a:gd name="connsiteX0" fmla="*/ 1293963 w 1293963"/>
-                <a:gd name="connsiteY0" fmla="*/ 1064634 h 1064634"/>
-                <a:gd name="connsiteX1" fmla="*/ 362310 w 1293963"/>
-                <a:gd name="connsiteY1" fmla="*/ 710951 h 1064634"/>
-                <a:gd name="connsiteX2" fmla="*/ 0 w 1293963"/>
-                <a:gd name="connsiteY2" fmla="*/ 3585 h 1064634"/>
-              </a:gdLst>
-              <a:ahLst/>
-              <a:cxnLst>
-                <a:cxn ang="0">
-                  <a:pos x="connsiteX0" y="connsiteY0"/>
-                </a:cxn>
-                <a:cxn ang="0">
-                  <a:pos x="connsiteX1" y="connsiteY1"/>
-                </a:cxn>
-                <a:cxn ang="0">
-                  <a:pos x="connsiteX2" y="connsiteY2"/>
-                </a:cxn>
-              </a:cxnLst>
-              <a:rect l="l" t="t" r="r" b="b"/>
-              <a:pathLst>
-                <a:path w="1293963" h="1064634">
-                  <a:moveTo>
-                    <a:pt x="1293963" y="1064634"/>
-                  </a:moveTo>
-                  <a:cubicBezTo>
-                    <a:pt x="935966" y="976213"/>
-                    <a:pt x="577970" y="887792"/>
-                    <a:pt x="362310" y="710951"/>
-                  </a:cubicBezTo>
-                  <a:cubicBezTo>
-                    <a:pt x="146650" y="534110"/>
-                    <a:pt x="24441" y="-51049"/>
-                    <a:pt x="0" y="3585"/>
-                  </a:cubicBezTo>
-                </a:path>
-              </a:pathLst>
-            </a:custGeom>
-            <a:noFill/>
-            <a:ln w="38100">
-              <a:solidFill>
-                <a:schemeClr val="tx1"/>
-              </a:solidFill>
-              <a:headEnd type="none" w="med" len="med"/>
-              <a:tailEnd type="triangle" w="med" len="med"/>
             </a:ln>
           </p:spPr>
           <p:style>
@@ -11726,7 +11337,7 @@
               <a:p>
                 <a:r>
                   <a:rPr lang="en-US" dirty="0"/>
-                  <a:t>3</a:t>
+                  <a:t>2</a:t>
                 </a:r>
               </a:p>
             </p:txBody>
@@ -13838,47 +13449,6 @@
             </a:p>
           </p:txBody>
         </p:sp>
-        <p:sp>
-          <p:nvSpPr>
-            <p:cNvPr id="18" name="TextBox 17"/>
-            <p:cNvSpPr txBox="1"/>
-            <p:nvPr/>
-          </p:nvSpPr>
-          <p:spPr>
-            <a:xfrm>
-              <a:off x="1190445" y="4740540"/>
-              <a:ext cx="547870" cy="397948"/>
-            </a:xfrm>
-            <a:prstGeom prst="rect">
-              <a:avLst/>
-            </a:prstGeom>
-            <a:noFill/>
-          </p:spPr>
-          <p:txBody>
-            <a:bodyPr wrap="none" rtlCol="0">
-              <a:spAutoFit/>
-            </a:bodyPr>
-            <a:lstStyle/>
-            <a:p>
-              <a:r>
-                <a:rPr lang="en-US" dirty="0">
-                  <a:solidFill>
-                    <a:srgbClr val="FF0000"/>
-                  </a:solidFill>
-                </a:rPr>
-                <a:t>0/</a:t>
-              </a:r>
-              <a:r>
-                <a:rPr lang="en-US" dirty="0">
-                  <a:solidFill>
-                    <a:srgbClr val="00B050"/>
-                  </a:solidFill>
-                </a:rPr>
-                <a:t>1</a:t>
-              </a:r>
-            </a:p>
-          </p:txBody>
-        </p:sp>
         <p:cxnSp>
           <p:nvCxnSpPr>
             <p:cNvPr id="19" name="Straight Connector 18"/>
@@ -14395,92 +13965,6 @@
               </a:solidFill>
               <a:headEnd type="triangle" w="med" len="med"/>
               <a:tailEnd type="none" w="med" len="med"/>
-            </a:ln>
-          </p:spPr>
-          <p:style>
-            <a:lnRef idx="2">
-              <a:schemeClr val="accent1">
-                <a:shade val="50000"/>
-              </a:schemeClr>
-            </a:lnRef>
-            <a:fillRef idx="1">
-              <a:schemeClr val="accent1"/>
-            </a:fillRef>
-            <a:effectRef idx="0">
-              <a:schemeClr val="accent1"/>
-            </a:effectRef>
-            <a:fontRef idx="minor">
-              <a:schemeClr val="lt1"/>
-            </a:fontRef>
-          </p:style>
-          <p:txBody>
-            <a:bodyPr rtlCol="0" anchor="ctr"/>
-            <a:lstStyle/>
-            <a:p>
-              <a:pPr algn="ctr"/>
-              <a:endParaRPr lang="en-US"/>
-            </a:p>
-          </p:txBody>
-        </p:sp>
-        <p:sp>
-          <p:nvSpPr>
-            <p:cNvPr id="28" name="Freeform 27"/>
-            <p:cNvSpPr/>
-            <p:nvPr/>
-          </p:nvSpPr>
-          <p:spPr>
-            <a:xfrm>
-              <a:off x="1190445" y="4093962"/>
-              <a:ext cx="1293963" cy="1064634"/>
-            </a:xfrm>
-            <a:custGeom>
-              <a:avLst/>
-              <a:gdLst>
-                <a:gd name="connsiteX0" fmla="*/ 1293963 w 1293963"/>
-                <a:gd name="connsiteY0" fmla="*/ 1064634 h 1064634"/>
-                <a:gd name="connsiteX1" fmla="*/ 362310 w 1293963"/>
-                <a:gd name="connsiteY1" fmla="*/ 710951 h 1064634"/>
-                <a:gd name="connsiteX2" fmla="*/ 0 w 1293963"/>
-                <a:gd name="connsiteY2" fmla="*/ 3585 h 1064634"/>
-              </a:gdLst>
-              <a:ahLst/>
-              <a:cxnLst>
-                <a:cxn ang="0">
-                  <a:pos x="connsiteX0" y="connsiteY0"/>
-                </a:cxn>
-                <a:cxn ang="0">
-                  <a:pos x="connsiteX1" y="connsiteY1"/>
-                </a:cxn>
-                <a:cxn ang="0">
-                  <a:pos x="connsiteX2" y="connsiteY2"/>
-                </a:cxn>
-              </a:cxnLst>
-              <a:rect l="l" t="t" r="r" b="b"/>
-              <a:pathLst>
-                <a:path w="1293963" h="1064634">
-                  <a:moveTo>
-                    <a:pt x="1293963" y="1064634"/>
-                  </a:moveTo>
-                  <a:cubicBezTo>
-                    <a:pt x="935966" y="976213"/>
-                    <a:pt x="577970" y="887792"/>
-                    <a:pt x="362310" y="710951"/>
-                  </a:cubicBezTo>
-                  <a:cubicBezTo>
-                    <a:pt x="146650" y="534110"/>
-                    <a:pt x="24441" y="-51049"/>
-                    <a:pt x="0" y="3585"/>
-                  </a:cubicBezTo>
-                </a:path>
-              </a:pathLst>
-            </a:custGeom>
-            <a:noFill/>
-            <a:ln w="38100">
-              <a:solidFill>
-                <a:schemeClr val="tx1"/>
-              </a:solidFill>
-              <a:headEnd type="none" w="med" len="med"/>
-              <a:tailEnd type="triangle" w="med" len="med"/>
             </a:ln>
           </p:spPr>
           <p:style>
@@ -15984,7 +15468,7 @@
               <a:p>
                 <a:r>
                   <a:rPr lang="en-US" dirty="0"/>
-                  <a:t>3</a:t>
+                  <a:t>2</a:t>
                 </a:r>
               </a:p>
             </p:txBody>
@@ -20061,7 +19545,7 @@
               <a:p>
                 <a:r>
                   <a:rPr lang="en-US" dirty="0"/>
-                  <a:t>3</a:t>
+                  <a:t>2</a:t>
                 </a:r>
               </a:p>
             </p:txBody>
@@ -21685,53 +21169,6 @@
             </a:p>
           </p:txBody>
         </p:sp>
-        <p:sp>
-          <p:nvSpPr>
-            <p:cNvPr id="63" name="TextBox 62">
-              <a:extLst>
-                <a:ext uri="{FF2B5EF4-FFF2-40B4-BE49-F238E27FC236}">
-                  <a16:creationId xmlns:a16="http://schemas.microsoft.com/office/drawing/2014/main" id="{C5B2B90F-BDBD-DB4E-991B-B8D01474969E}"/>
-                </a:ext>
-              </a:extLst>
-            </p:cNvPr>
-            <p:cNvSpPr txBox="1"/>
-            <p:nvPr/>
-          </p:nvSpPr>
-          <p:spPr>
-            <a:xfrm>
-              <a:off x="1190445" y="4740540"/>
-              <a:ext cx="547870" cy="397948"/>
-            </a:xfrm>
-            <a:prstGeom prst="rect">
-              <a:avLst/>
-            </a:prstGeom>
-            <a:noFill/>
-          </p:spPr>
-          <p:txBody>
-            <a:bodyPr wrap="none" rtlCol="0">
-              <a:spAutoFit/>
-            </a:bodyPr>
-            <a:lstStyle/>
-            <a:p>
-              <a:r>
-                <a:rPr lang="en-US" dirty="0">
-                  <a:solidFill>
-                    <a:srgbClr val="FF0000"/>
-                  </a:solidFill>
-                </a:rPr>
-                <a:t>0/</a:t>
-              </a:r>
-              <a:r>
-                <a:rPr lang="en-US" dirty="0">
-                  <a:solidFill>
-                    <a:srgbClr val="00B050"/>
-                  </a:solidFill>
-                </a:rPr>
-                <a:t>1</a:t>
-              </a:r>
-            </a:p>
-          </p:txBody>
-        </p:sp>
         <p:cxnSp>
           <p:nvCxnSpPr>
             <p:cNvPr id="64" name="Straight Connector 63">
@@ -22302,98 +21739,6 @@
               </a:solidFill>
               <a:headEnd type="triangle" w="med" len="med"/>
               <a:tailEnd type="none" w="med" len="med"/>
-            </a:ln>
-          </p:spPr>
-          <p:style>
-            <a:lnRef idx="2">
-              <a:schemeClr val="accent1">
-                <a:shade val="50000"/>
-              </a:schemeClr>
-            </a:lnRef>
-            <a:fillRef idx="1">
-              <a:schemeClr val="accent1"/>
-            </a:fillRef>
-            <a:effectRef idx="0">
-              <a:schemeClr val="accent1"/>
-            </a:effectRef>
-            <a:fontRef idx="minor">
-              <a:schemeClr val="lt1"/>
-            </a:fontRef>
-          </p:style>
-          <p:txBody>
-            <a:bodyPr rtlCol="0" anchor="ctr"/>
-            <a:lstStyle/>
-            <a:p>
-              <a:pPr algn="ctr"/>
-              <a:endParaRPr lang="en-US"/>
-            </a:p>
-          </p:txBody>
-        </p:sp>
-        <p:sp>
-          <p:nvSpPr>
-            <p:cNvPr id="73" name="Freeform 72">
-              <a:extLst>
-                <a:ext uri="{FF2B5EF4-FFF2-40B4-BE49-F238E27FC236}">
-                  <a16:creationId xmlns:a16="http://schemas.microsoft.com/office/drawing/2014/main" id="{8AAFDD35-F271-5140-8D80-6E9C16050BA7}"/>
-                </a:ext>
-              </a:extLst>
-            </p:cNvPr>
-            <p:cNvSpPr/>
-            <p:nvPr/>
-          </p:nvSpPr>
-          <p:spPr>
-            <a:xfrm>
-              <a:off x="1190445" y="4093962"/>
-              <a:ext cx="1293963" cy="1064634"/>
-            </a:xfrm>
-            <a:custGeom>
-              <a:avLst/>
-              <a:gdLst>
-                <a:gd name="connsiteX0" fmla="*/ 1293963 w 1293963"/>
-                <a:gd name="connsiteY0" fmla="*/ 1064634 h 1064634"/>
-                <a:gd name="connsiteX1" fmla="*/ 362310 w 1293963"/>
-                <a:gd name="connsiteY1" fmla="*/ 710951 h 1064634"/>
-                <a:gd name="connsiteX2" fmla="*/ 0 w 1293963"/>
-                <a:gd name="connsiteY2" fmla="*/ 3585 h 1064634"/>
-              </a:gdLst>
-              <a:ahLst/>
-              <a:cxnLst>
-                <a:cxn ang="0">
-                  <a:pos x="connsiteX0" y="connsiteY0"/>
-                </a:cxn>
-                <a:cxn ang="0">
-                  <a:pos x="connsiteX1" y="connsiteY1"/>
-                </a:cxn>
-                <a:cxn ang="0">
-                  <a:pos x="connsiteX2" y="connsiteY2"/>
-                </a:cxn>
-              </a:cxnLst>
-              <a:rect l="l" t="t" r="r" b="b"/>
-              <a:pathLst>
-                <a:path w="1293963" h="1064634">
-                  <a:moveTo>
-                    <a:pt x="1293963" y="1064634"/>
-                  </a:moveTo>
-                  <a:cubicBezTo>
-                    <a:pt x="935966" y="976213"/>
-                    <a:pt x="577970" y="887792"/>
-                    <a:pt x="362310" y="710951"/>
-                  </a:cubicBezTo>
-                  <a:cubicBezTo>
-                    <a:pt x="146650" y="534110"/>
-                    <a:pt x="24441" y="-51049"/>
-                    <a:pt x="0" y="3585"/>
-                  </a:cubicBezTo>
-                </a:path>
-              </a:pathLst>
-            </a:custGeom>
-            <a:noFill/>
-            <a:ln w="38100">
-              <a:solidFill>
-                <a:schemeClr val="tx1"/>
-              </a:solidFill>
-              <a:headEnd type="none" w="med" len="med"/>
-              <a:tailEnd type="triangle" w="med" len="med"/>
             </a:ln>
           </p:spPr>
           <p:style>
@@ -24986,7 +24331,7 @@
               <a:p>
                 <a:r>
                   <a:rPr lang="en-US" dirty="0"/>
-                  <a:t>3</a:t>
+                  <a:t>2</a:t>
                 </a:r>
               </a:p>
             </p:txBody>
@@ -26610,53 +25955,6 @@
             </a:p>
           </p:txBody>
         </p:sp>
-        <p:sp>
-          <p:nvSpPr>
-            <p:cNvPr id="63" name="TextBox 62">
-              <a:extLst>
-                <a:ext uri="{FF2B5EF4-FFF2-40B4-BE49-F238E27FC236}">
-                  <a16:creationId xmlns:a16="http://schemas.microsoft.com/office/drawing/2014/main" id="{C5B2B90F-BDBD-DB4E-991B-B8D01474969E}"/>
-                </a:ext>
-              </a:extLst>
-            </p:cNvPr>
-            <p:cNvSpPr txBox="1"/>
-            <p:nvPr/>
-          </p:nvSpPr>
-          <p:spPr>
-            <a:xfrm>
-              <a:off x="1190445" y="4740540"/>
-              <a:ext cx="547870" cy="397948"/>
-            </a:xfrm>
-            <a:prstGeom prst="rect">
-              <a:avLst/>
-            </a:prstGeom>
-            <a:noFill/>
-          </p:spPr>
-          <p:txBody>
-            <a:bodyPr wrap="none" rtlCol="0">
-              <a:spAutoFit/>
-            </a:bodyPr>
-            <a:lstStyle/>
-            <a:p>
-              <a:r>
-                <a:rPr lang="en-US" dirty="0">
-                  <a:solidFill>
-                    <a:srgbClr val="FF0000"/>
-                  </a:solidFill>
-                </a:rPr>
-                <a:t>0/</a:t>
-              </a:r>
-              <a:r>
-                <a:rPr lang="en-US" dirty="0">
-                  <a:solidFill>
-                    <a:srgbClr val="00B050"/>
-                  </a:solidFill>
-                </a:rPr>
-                <a:t>1</a:t>
-              </a:r>
-            </a:p>
-          </p:txBody>
-        </p:sp>
         <p:cxnSp>
           <p:nvCxnSpPr>
             <p:cNvPr id="64" name="Straight Connector 63">
@@ -27227,98 +26525,6 @@
               </a:solidFill>
               <a:headEnd type="triangle" w="med" len="med"/>
               <a:tailEnd type="none" w="med" len="med"/>
-            </a:ln>
-          </p:spPr>
-          <p:style>
-            <a:lnRef idx="2">
-              <a:schemeClr val="accent1">
-                <a:shade val="50000"/>
-              </a:schemeClr>
-            </a:lnRef>
-            <a:fillRef idx="1">
-              <a:schemeClr val="accent1"/>
-            </a:fillRef>
-            <a:effectRef idx="0">
-              <a:schemeClr val="accent1"/>
-            </a:effectRef>
-            <a:fontRef idx="minor">
-              <a:schemeClr val="lt1"/>
-            </a:fontRef>
-          </p:style>
-          <p:txBody>
-            <a:bodyPr rtlCol="0" anchor="ctr"/>
-            <a:lstStyle/>
-            <a:p>
-              <a:pPr algn="ctr"/>
-              <a:endParaRPr lang="en-US"/>
-            </a:p>
-          </p:txBody>
-        </p:sp>
-        <p:sp>
-          <p:nvSpPr>
-            <p:cNvPr id="73" name="Freeform 72">
-              <a:extLst>
-                <a:ext uri="{FF2B5EF4-FFF2-40B4-BE49-F238E27FC236}">
-                  <a16:creationId xmlns:a16="http://schemas.microsoft.com/office/drawing/2014/main" id="{8AAFDD35-F271-5140-8D80-6E9C16050BA7}"/>
-                </a:ext>
-              </a:extLst>
-            </p:cNvPr>
-            <p:cNvSpPr/>
-            <p:nvPr/>
-          </p:nvSpPr>
-          <p:spPr>
-            <a:xfrm>
-              <a:off x="1190445" y="4093962"/>
-              <a:ext cx="1293963" cy="1064634"/>
-            </a:xfrm>
-            <a:custGeom>
-              <a:avLst/>
-              <a:gdLst>
-                <a:gd name="connsiteX0" fmla="*/ 1293963 w 1293963"/>
-                <a:gd name="connsiteY0" fmla="*/ 1064634 h 1064634"/>
-                <a:gd name="connsiteX1" fmla="*/ 362310 w 1293963"/>
-                <a:gd name="connsiteY1" fmla="*/ 710951 h 1064634"/>
-                <a:gd name="connsiteX2" fmla="*/ 0 w 1293963"/>
-                <a:gd name="connsiteY2" fmla="*/ 3585 h 1064634"/>
-              </a:gdLst>
-              <a:ahLst/>
-              <a:cxnLst>
-                <a:cxn ang="0">
-                  <a:pos x="connsiteX0" y="connsiteY0"/>
-                </a:cxn>
-                <a:cxn ang="0">
-                  <a:pos x="connsiteX1" y="connsiteY1"/>
-                </a:cxn>
-                <a:cxn ang="0">
-                  <a:pos x="connsiteX2" y="connsiteY2"/>
-                </a:cxn>
-              </a:cxnLst>
-              <a:rect l="l" t="t" r="r" b="b"/>
-              <a:pathLst>
-                <a:path w="1293963" h="1064634">
-                  <a:moveTo>
-                    <a:pt x="1293963" y="1064634"/>
-                  </a:moveTo>
-                  <a:cubicBezTo>
-                    <a:pt x="935966" y="976213"/>
-                    <a:pt x="577970" y="887792"/>
-                    <a:pt x="362310" y="710951"/>
-                  </a:cubicBezTo>
-                  <a:cubicBezTo>
-                    <a:pt x="146650" y="534110"/>
-                    <a:pt x="24441" y="-51049"/>
-                    <a:pt x="0" y="3585"/>
-                  </a:cubicBezTo>
-                </a:path>
-              </a:pathLst>
-            </a:custGeom>
-            <a:noFill/>
-            <a:ln w="38100">
-              <a:solidFill>
-                <a:schemeClr val="tx1"/>
-              </a:solidFill>
-              <a:headEnd type="none" w="med" len="med"/>
-              <a:tailEnd type="triangle" w="med" len="med"/>
             </a:ln>
           </p:spPr>
           <p:style>
@@ -38220,229 +37426,6 @@
         </p:cxnSp>
         <p:sp>
           <p:nvSpPr>
-            <p:cNvPr id="27" name="Freeform 26">
-              <a:extLst>
-                <a:ext uri="{FF2B5EF4-FFF2-40B4-BE49-F238E27FC236}">
-                  <a16:creationId xmlns:a16="http://schemas.microsoft.com/office/drawing/2014/main" id="{4C5F130D-6F69-D24E-B62C-FF7AF6BC31BD}"/>
-                </a:ext>
-              </a:extLst>
-            </p:cNvPr>
-            <p:cNvSpPr/>
-            <p:nvPr/>
-          </p:nvSpPr>
-          <p:spPr>
-            <a:xfrm>
-              <a:off x="4370266" y="3581400"/>
-              <a:ext cx="201734" cy="1364776"/>
-            </a:xfrm>
-            <a:custGeom>
-              <a:avLst/>
-              <a:gdLst>
-                <a:gd name="connsiteX0" fmla="*/ 77638 w 201734"/>
-                <a:gd name="connsiteY0" fmla="*/ 1364776 h 1364776"/>
-                <a:gd name="connsiteX1" fmla="*/ 200467 w 201734"/>
-                <a:gd name="connsiteY1" fmla="*/ 655093 h 1364776"/>
-                <a:gd name="connsiteX2" fmla="*/ 9399 w 201734"/>
-                <a:gd name="connsiteY2" fmla="*/ 0 h 1364776"/>
-              </a:gdLst>
-              <a:ahLst/>
-              <a:cxnLst>
-                <a:cxn ang="0">
-                  <a:pos x="connsiteX0" y="connsiteY0"/>
-                </a:cxn>
-                <a:cxn ang="0">
-                  <a:pos x="connsiteX1" y="connsiteY1"/>
-                </a:cxn>
-                <a:cxn ang="0">
-                  <a:pos x="connsiteX2" y="connsiteY2"/>
-                </a:cxn>
-              </a:cxnLst>
-              <a:rect l="l" t="t" r="r" b="b"/>
-              <a:pathLst>
-                <a:path w="201734" h="1364776">
-                  <a:moveTo>
-                    <a:pt x="77638" y="1364776"/>
-                  </a:moveTo>
-                  <a:cubicBezTo>
-                    <a:pt x="144739" y="1123666"/>
-                    <a:pt x="211840" y="882556"/>
-                    <a:pt x="200467" y="655093"/>
-                  </a:cubicBezTo>
-                  <a:cubicBezTo>
-                    <a:pt x="189094" y="427630"/>
-                    <a:pt x="-49741" y="9098"/>
-                    <a:pt x="9399" y="0"/>
-                  </a:cubicBezTo>
-                </a:path>
-              </a:pathLst>
-            </a:custGeom>
-            <a:noFill/>
-            <a:ln w="38100">
-              <a:solidFill>
-                <a:schemeClr val="tx1"/>
-              </a:solidFill>
-              <a:headEnd type="triangle" w="med" len="med"/>
-              <a:tailEnd type="none" w="med" len="med"/>
-            </a:ln>
-          </p:spPr>
-          <p:style>
-            <a:lnRef idx="2">
-              <a:schemeClr val="accent1">
-                <a:shade val="50000"/>
-              </a:schemeClr>
-            </a:lnRef>
-            <a:fillRef idx="1">
-              <a:schemeClr val="accent1"/>
-            </a:fillRef>
-            <a:effectRef idx="0">
-              <a:schemeClr val="accent1"/>
-            </a:effectRef>
-            <a:fontRef idx="minor">
-              <a:schemeClr val="lt1"/>
-            </a:fontRef>
-          </p:style>
-          <p:txBody>
-            <a:bodyPr rtlCol="0" anchor="ctr"/>
-            <a:lstStyle/>
-            <a:p>
-              <a:pPr algn="ctr"/>
-              <a:endParaRPr lang="en-US"/>
-            </a:p>
-          </p:txBody>
-        </p:sp>
-        <p:sp>
-          <p:nvSpPr>
-            <p:cNvPr id="28" name="Freeform 27">
-              <a:extLst>
-                <a:ext uri="{FF2B5EF4-FFF2-40B4-BE49-F238E27FC236}">
-                  <a16:creationId xmlns:a16="http://schemas.microsoft.com/office/drawing/2014/main" id="{2B479DF3-7837-6E46-83B0-900A5894A3DE}"/>
-                </a:ext>
-              </a:extLst>
-            </p:cNvPr>
-            <p:cNvSpPr/>
-            <p:nvPr/>
-          </p:nvSpPr>
-          <p:spPr>
-            <a:xfrm>
-              <a:off x="1190445" y="4093962"/>
-              <a:ext cx="1293963" cy="1064634"/>
-            </a:xfrm>
-            <a:custGeom>
-              <a:avLst/>
-              <a:gdLst>
-                <a:gd name="connsiteX0" fmla="*/ 1293963 w 1293963"/>
-                <a:gd name="connsiteY0" fmla="*/ 1064634 h 1064634"/>
-                <a:gd name="connsiteX1" fmla="*/ 362310 w 1293963"/>
-                <a:gd name="connsiteY1" fmla="*/ 710951 h 1064634"/>
-                <a:gd name="connsiteX2" fmla="*/ 0 w 1293963"/>
-                <a:gd name="connsiteY2" fmla="*/ 3585 h 1064634"/>
-              </a:gdLst>
-              <a:ahLst/>
-              <a:cxnLst>
-                <a:cxn ang="0">
-                  <a:pos x="connsiteX0" y="connsiteY0"/>
-                </a:cxn>
-                <a:cxn ang="0">
-                  <a:pos x="connsiteX1" y="connsiteY1"/>
-                </a:cxn>
-                <a:cxn ang="0">
-                  <a:pos x="connsiteX2" y="connsiteY2"/>
-                </a:cxn>
-              </a:cxnLst>
-              <a:rect l="l" t="t" r="r" b="b"/>
-              <a:pathLst>
-                <a:path w="1293963" h="1064634">
-                  <a:moveTo>
-                    <a:pt x="1293963" y="1064634"/>
-                  </a:moveTo>
-                  <a:cubicBezTo>
-                    <a:pt x="935966" y="976213"/>
-                    <a:pt x="577970" y="887792"/>
-                    <a:pt x="362310" y="710951"/>
-                  </a:cubicBezTo>
-                  <a:cubicBezTo>
-                    <a:pt x="146650" y="534110"/>
-                    <a:pt x="24441" y="-51049"/>
-                    <a:pt x="0" y="3585"/>
-                  </a:cubicBezTo>
-                </a:path>
-              </a:pathLst>
-            </a:custGeom>
-            <a:noFill/>
-            <a:ln w="38100">
-              <a:solidFill>
-                <a:schemeClr val="tx1"/>
-              </a:solidFill>
-              <a:headEnd type="none" w="med" len="med"/>
-              <a:tailEnd type="triangle" w="med" len="med"/>
-            </a:ln>
-          </p:spPr>
-          <p:style>
-            <a:lnRef idx="2">
-              <a:schemeClr val="accent1">
-                <a:shade val="50000"/>
-              </a:schemeClr>
-            </a:lnRef>
-            <a:fillRef idx="1">
-              <a:schemeClr val="accent1"/>
-            </a:fillRef>
-            <a:effectRef idx="0">
-              <a:schemeClr val="accent1"/>
-            </a:effectRef>
-            <a:fontRef idx="minor">
-              <a:schemeClr val="lt1"/>
-            </a:fontRef>
-          </p:style>
-          <p:txBody>
-            <a:bodyPr rtlCol="0" anchor="ctr"/>
-            <a:lstStyle/>
-            <a:p>
-              <a:pPr algn="ctr"/>
-              <a:endParaRPr lang="en-US"/>
-            </a:p>
-          </p:txBody>
-        </p:sp>
-        <p:sp>
-          <p:nvSpPr>
-            <p:cNvPr id="29" name="TextBox 28">
-              <a:extLst>
-                <a:ext uri="{FF2B5EF4-FFF2-40B4-BE49-F238E27FC236}">
-                  <a16:creationId xmlns:a16="http://schemas.microsoft.com/office/drawing/2014/main" id="{A8D8DBEA-87CA-724F-9D80-13D4470A7279}"/>
-                </a:ext>
-              </a:extLst>
-            </p:cNvPr>
-            <p:cNvSpPr txBox="1"/>
-            <p:nvPr/>
-          </p:nvSpPr>
-          <p:spPr>
-            <a:xfrm>
-              <a:off x="1371600" y="4724400"/>
-              <a:ext cx="339228" cy="415292"/>
-            </a:xfrm>
-            <a:prstGeom prst="rect">
-              <a:avLst/>
-            </a:prstGeom>
-            <a:noFill/>
-          </p:spPr>
-          <p:txBody>
-            <a:bodyPr wrap="none" rtlCol="0">
-              <a:spAutoFit/>
-            </a:bodyPr>
-            <a:lstStyle/>
-            <a:p>
-              <a:r>
-                <a:rPr lang="en-US" dirty="0">
-                  <a:solidFill>
-                    <a:srgbClr val="00B050"/>
-                  </a:solidFill>
-                </a:rPr>
-                <a:t>1</a:t>
-              </a:r>
-            </a:p>
-          </p:txBody>
-        </p:sp>
-        <p:sp>
-          <p:nvSpPr>
             <p:cNvPr id="30" name="TextBox 29">
               <a:extLst>
                 <a:ext uri="{FF2B5EF4-FFF2-40B4-BE49-F238E27FC236}">
@@ -38554,45 +37537,6 @@
                   </a:solidFill>
                 </a:rPr>
                 <a:t>3</a:t>
-              </a:r>
-            </a:p>
-          </p:txBody>
-        </p:sp>
-        <p:sp>
-          <p:nvSpPr>
-            <p:cNvPr id="33" name="TextBox 32">
-              <a:extLst>
-                <a:ext uri="{FF2B5EF4-FFF2-40B4-BE49-F238E27FC236}">
-                  <a16:creationId xmlns:a16="http://schemas.microsoft.com/office/drawing/2014/main" id="{50FC376E-9B5F-EF4F-971A-18FCDC266604}"/>
-                </a:ext>
-              </a:extLst>
-            </p:cNvPr>
-            <p:cNvSpPr txBox="1"/>
-            <p:nvPr/>
-          </p:nvSpPr>
-          <p:spPr>
-            <a:xfrm>
-              <a:off x="4572000" y="4069514"/>
-              <a:ext cx="339228" cy="415292"/>
-            </a:xfrm>
-            <a:prstGeom prst="rect">
-              <a:avLst/>
-            </a:prstGeom>
-            <a:noFill/>
-          </p:spPr>
-          <p:txBody>
-            <a:bodyPr wrap="none" rtlCol="0">
-              <a:spAutoFit/>
-            </a:bodyPr>
-            <a:lstStyle/>
-            <a:p>
-              <a:r>
-                <a:rPr lang="en-US" dirty="0">
-                  <a:solidFill>
-                    <a:srgbClr val="00B050"/>
-                  </a:solidFill>
-                </a:rPr>
-                <a:t>2</a:t>
               </a:r>
             </a:p>
           </p:txBody>
@@ -40611,211 +39555,6 @@
         </p:cxnSp>
         <p:sp>
           <p:nvSpPr>
-            <p:cNvPr id="25" name="Freeform 24"/>
-            <p:cNvSpPr/>
-            <p:nvPr/>
-          </p:nvSpPr>
-          <p:spPr>
-            <a:xfrm>
-              <a:off x="4370266" y="3581400"/>
-              <a:ext cx="201734" cy="1364776"/>
-            </a:xfrm>
-            <a:custGeom>
-              <a:avLst/>
-              <a:gdLst>
-                <a:gd name="connsiteX0" fmla="*/ 77638 w 201734"/>
-                <a:gd name="connsiteY0" fmla="*/ 1364776 h 1364776"/>
-                <a:gd name="connsiteX1" fmla="*/ 200467 w 201734"/>
-                <a:gd name="connsiteY1" fmla="*/ 655093 h 1364776"/>
-                <a:gd name="connsiteX2" fmla="*/ 9399 w 201734"/>
-                <a:gd name="connsiteY2" fmla="*/ 0 h 1364776"/>
-              </a:gdLst>
-              <a:ahLst/>
-              <a:cxnLst>
-                <a:cxn ang="0">
-                  <a:pos x="connsiteX0" y="connsiteY0"/>
-                </a:cxn>
-                <a:cxn ang="0">
-                  <a:pos x="connsiteX1" y="connsiteY1"/>
-                </a:cxn>
-                <a:cxn ang="0">
-                  <a:pos x="connsiteX2" y="connsiteY2"/>
-                </a:cxn>
-              </a:cxnLst>
-              <a:rect l="l" t="t" r="r" b="b"/>
-              <a:pathLst>
-                <a:path w="201734" h="1364776">
-                  <a:moveTo>
-                    <a:pt x="77638" y="1364776"/>
-                  </a:moveTo>
-                  <a:cubicBezTo>
-                    <a:pt x="144739" y="1123666"/>
-                    <a:pt x="211840" y="882556"/>
-                    <a:pt x="200467" y="655093"/>
-                  </a:cubicBezTo>
-                  <a:cubicBezTo>
-                    <a:pt x="189094" y="427630"/>
-                    <a:pt x="-49741" y="9098"/>
-                    <a:pt x="9399" y="0"/>
-                  </a:cubicBezTo>
-                </a:path>
-              </a:pathLst>
-            </a:custGeom>
-            <a:noFill/>
-            <a:ln w="38100">
-              <a:solidFill>
-                <a:schemeClr val="tx1"/>
-              </a:solidFill>
-              <a:headEnd type="triangle" w="med" len="med"/>
-              <a:tailEnd type="none" w="med" len="med"/>
-            </a:ln>
-          </p:spPr>
-          <p:style>
-            <a:lnRef idx="2">
-              <a:schemeClr val="accent1">
-                <a:shade val="50000"/>
-              </a:schemeClr>
-            </a:lnRef>
-            <a:fillRef idx="1">
-              <a:schemeClr val="accent1"/>
-            </a:fillRef>
-            <a:effectRef idx="0">
-              <a:schemeClr val="accent1"/>
-            </a:effectRef>
-            <a:fontRef idx="minor">
-              <a:schemeClr val="lt1"/>
-            </a:fontRef>
-          </p:style>
-          <p:txBody>
-            <a:bodyPr rtlCol="0" anchor="ctr"/>
-            <a:lstStyle/>
-            <a:p>
-              <a:pPr algn="ctr"/>
-              <a:endParaRPr lang="en-US"/>
-            </a:p>
-          </p:txBody>
-        </p:sp>
-        <p:sp>
-          <p:nvSpPr>
-            <p:cNvPr id="26" name="Freeform 25"/>
-            <p:cNvSpPr/>
-            <p:nvPr/>
-          </p:nvSpPr>
-          <p:spPr>
-            <a:xfrm>
-              <a:off x="1190445" y="4093962"/>
-              <a:ext cx="1293963" cy="1064634"/>
-            </a:xfrm>
-            <a:custGeom>
-              <a:avLst/>
-              <a:gdLst>
-                <a:gd name="connsiteX0" fmla="*/ 1293963 w 1293963"/>
-                <a:gd name="connsiteY0" fmla="*/ 1064634 h 1064634"/>
-                <a:gd name="connsiteX1" fmla="*/ 362310 w 1293963"/>
-                <a:gd name="connsiteY1" fmla="*/ 710951 h 1064634"/>
-                <a:gd name="connsiteX2" fmla="*/ 0 w 1293963"/>
-                <a:gd name="connsiteY2" fmla="*/ 3585 h 1064634"/>
-              </a:gdLst>
-              <a:ahLst/>
-              <a:cxnLst>
-                <a:cxn ang="0">
-                  <a:pos x="connsiteX0" y="connsiteY0"/>
-                </a:cxn>
-                <a:cxn ang="0">
-                  <a:pos x="connsiteX1" y="connsiteY1"/>
-                </a:cxn>
-                <a:cxn ang="0">
-                  <a:pos x="connsiteX2" y="connsiteY2"/>
-                </a:cxn>
-              </a:cxnLst>
-              <a:rect l="l" t="t" r="r" b="b"/>
-              <a:pathLst>
-                <a:path w="1293963" h="1064634">
-                  <a:moveTo>
-                    <a:pt x="1293963" y="1064634"/>
-                  </a:moveTo>
-                  <a:cubicBezTo>
-                    <a:pt x="935966" y="976213"/>
-                    <a:pt x="577970" y="887792"/>
-                    <a:pt x="362310" y="710951"/>
-                  </a:cubicBezTo>
-                  <a:cubicBezTo>
-                    <a:pt x="146650" y="534110"/>
-                    <a:pt x="24441" y="-51049"/>
-                    <a:pt x="0" y="3585"/>
-                  </a:cubicBezTo>
-                </a:path>
-              </a:pathLst>
-            </a:custGeom>
-            <a:noFill/>
-            <a:ln w="38100">
-              <a:solidFill>
-                <a:schemeClr val="tx1"/>
-              </a:solidFill>
-              <a:headEnd type="none" w="med" len="med"/>
-              <a:tailEnd type="triangle" w="med" len="med"/>
-            </a:ln>
-          </p:spPr>
-          <p:style>
-            <a:lnRef idx="2">
-              <a:schemeClr val="accent1">
-                <a:shade val="50000"/>
-              </a:schemeClr>
-            </a:lnRef>
-            <a:fillRef idx="1">
-              <a:schemeClr val="accent1"/>
-            </a:fillRef>
-            <a:effectRef idx="0">
-              <a:schemeClr val="accent1"/>
-            </a:effectRef>
-            <a:fontRef idx="minor">
-              <a:schemeClr val="lt1"/>
-            </a:fontRef>
-          </p:style>
-          <p:txBody>
-            <a:bodyPr rtlCol="0" anchor="ctr"/>
-            <a:lstStyle/>
-            <a:p>
-              <a:pPr algn="ctr"/>
-              <a:endParaRPr lang="en-US"/>
-            </a:p>
-          </p:txBody>
-        </p:sp>
-        <p:sp>
-          <p:nvSpPr>
-            <p:cNvPr id="27" name="TextBox 26"/>
-            <p:cNvSpPr txBox="1"/>
-            <p:nvPr/>
-          </p:nvSpPr>
-          <p:spPr>
-            <a:xfrm>
-              <a:off x="1371600" y="4724400"/>
-              <a:ext cx="339228" cy="415292"/>
-            </a:xfrm>
-            <a:prstGeom prst="rect">
-              <a:avLst/>
-            </a:prstGeom>
-            <a:noFill/>
-          </p:spPr>
-          <p:txBody>
-            <a:bodyPr wrap="none" rtlCol="0">
-              <a:spAutoFit/>
-            </a:bodyPr>
-            <a:lstStyle/>
-            <a:p>
-              <a:r>
-                <a:rPr lang="en-US" dirty="0">
-                  <a:solidFill>
-                    <a:srgbClr val="00B050"/>
-                  </a:solidFill>
-                </a:rPr>
-                <a:t>1</a:t>
-              </a:r>
-            </a:p>
-          </p:txBody>
-        </p:sp>
-        <p:sp>
-          <p:nvSpPr>
             <p:cNvPr id="28" name="TextBox 27"/>
             <p:cNvSpPr txBox="1"/>
             <p:nvPr/>
@@ -40940,39 +39679,6 @@
                   </a:solidFill>
                 </a:rPr>
                 <a:t>3</a:t>
-              </a:r>
-            </a:p>
-          </p:txBody>
-        </p:sp>
-        <p:sp>
-          <p:nvSpPr>
-            <p:cNvPr id="31" name="TextBox 30"/>
-            <p:cNvSpPr txBox="1"/>
-            <p:nvPr/>
-          </p:nvSpPr>
-          <p:spPr>
-            <a:xfrm>
-              <a:off x="4572000" y="4069514"/>
-              <a:ext cx="339228" cy="415292"/>
-            </a:xfrm>
-            <a:prstGeom prst="rect">
-              <a:avLst/>
-            </a:prstGeom>
-            <a:noFill/>
-          </p:spPr>
-          <p:txBody>
-            <a:bodyPr wrap="none" rtlCol="0">
-              <a:spAutoFit/>
-            </a:bodyPr>
-            <a:lstStyle/>
-            <a:p>
-              <a:r>
-                <a:rPr lang="en-US" dirty="0">
-                  <a:solidFill>
-                    <a:srgbClr val="00B050"/>
-                  </a:solidFill>
-                </a:rPr>
-                <a:t>2</a:t>
               </a:r>
             </a:p>
           </p:txBody>

</xml_diff>

<commit_message>
another tweak to maxcut minflow slides
</commit_message>
<xml_diff>
--- a/slides/Maxcut-Minflow-f21.pptx
+++ b/slides/Maxcut-Minflow-f21.pptx
@@ -27920,8 +27920,13 @@
             </a:pPr>
             <a:r>
               <a:rPr lang="en-US" sz="2800" dirty="0"/>
-              <a:t>Proof by contradiction, using weak duality property</a:t>
+              <a:t>Proof </a:t>
             </a:r>
+            <a:r>
+              <a:rPr lang="en-US" sz="2800"/>
+              <a:t>by contradiction</a:t>
+            </a:r>
+            <a:endParaRPr lang="en-US" sz="2800" dirty="0"/>
           </a:p>
           <a:p>
             <a:pPr marL="514350" indent="-457200"/>

</xml_diff>

<commit_message>
fixed typo in 3rd part of max cut min flow proof
</commit_message>
<xml_diff>
--- a/slides/Maxcut-Minflow-f21.pptx
+++ b/slides/Maxcut-Minflow-f21.pptx
@@ -233,7 +233,7 @@
           <a:p>
             <a:fld id="{9A9F7FD5-2840-4607-A4CD-0A8A66D9D61D}" type="datetimeFigureOut">
               <a:rPr lang="en-US" smtClean="0"/>
-              <a:t>11/14/21</a:t>
+              <a:t>11/18/21</a:t>
             </a:fld>
             <a:endParaRPr lang="en-US"/>
           </a:p>
@@ -926,7 +926,7 @@
           <a:p>
             <a:fld id="{088A2421-D2CD-4522-A1BA-E4F59ED821B7}" type="datetime1">
               <a:rPr lang="en-US" smtClean="0"/>
-              <a:t>11/14/21</a:t>
+              <a:t>11/18/21</a:t>
             </a:fld>
             <a:endParaRPr lang="en-US"/>
           </a:p>
@@ -1201,7 +1201,7 @@
           <a:p>
             <a:fld id="{DA91928D-0C55-4D8D-9D16-4C05754E5356}" type="datetime1">
               <a:rPr lang="en-US" smtClean="0"/>
-              <a:t>11/14/21</a:t>
+              <a:t>11/18/21</a:t>
             </a:fld>
             <a:endParaRPr lang="en-US"/>
           </a:p>
@@ -1456,7 +1456,7 @@
           <a:p>
             <a:fld id="{584CEDDD-253B-4C38-A621-35D8BA950C17}" type="datetime1">
               <a:rPr lang="en-US" smtClean="0"/>
-              <a:t>11/14/21</a:t>
+              <a:t>11/18/21</a:t>
             </a:fld>
             <a:endParaRPr lang="en-US"/>
           </a:p>
@@ -1624,7 +1624,7 @@
           <a:p>
             <a:fld id="{BF0967E4-28CB-45C9-B82C-D6B22AD4F0EB}" type="datetime1">
               <a:rPr lang="en-US" smtClean="0"/>
-              <a:t>11/14/21</a:t>
+              <a:t>11/18/21</a:t>
             </a:fld>
             <a:endParaRPr lang="en-US"/>
           </a:p>
@@ -1802,7 +1802,7 @@
           <a:p>
             <a:fld id="{2454C693-B405-44E1-A127-B7CE8B45C1E1}" type="datetime1">
               <a:rPr lang="en-US" smtClean="0"/>
-              <a:t>11/14/21</a:t>
+              <a:t>11/18/21</a:t>
             </a:fld>
             <a:endParaRPr lang="en-US"/>
           </a:p>
@@ -1987,7 +1987,7 @@
           <a:p>
             <a:fld id="{26B28102-2E91-4DD7-8E8B-98B790A12701}" type="datetime1">
               <a:rPr lang="en-US" smtClean="0"/>
-              <a:t>11/14/21</a:t>
+              <a:t>11/18/21</a:t>
             </a:fld>
             <a:endParaRPr lang="en-US"/>
           </a:p>
@@ -2178,7 +2178,7 @@
           <a:p>
             <a:fld id="{0B5AF985-6D44-417A-9881-D208468CBA07}" type="datetime1">
               <a:rPr lang="en-US" smtClean="0"/>
-              <a:t>11/14/21</a:t>
+              <a:t>11/18/21</a:t>
             </a:fld>
             <a:endParaRPr lang="en-US"/>
           </a:p>
@@ -2368,7 +2368,7 @@
           <a:p>
             <a:fld id="{26B28102-2E91-4DD7-8E8B-98B790A12701}" type="datetime1">
               <a:rPr lang="en-US" smtClean="0"/>
-              <a:t>11/14/21</a:t>
+              <a:t>11/18/21</a:t>
             </a:fld>
             <a:endParaRPr lang="en-US"/>
           </a:p>
@@ -2614,7 +2614,7 @@
           <a:p>
             <a:fld id="{3A604A86-E8D2-4E57-8D6D-61E2D175474B}" type="datetime1">
               <a:rPr lang="en-US" smtClean="0"/>
-              <a:t>11/14/21</a:t>
+              <a:t>11/18/21</a:t>
             </a:fld>
             <a:endParaRPr lang="en-US"/>
           </a:p>
@@ -2910,7 +2910,7 @@
           <a:p>
             <a:fld id="{DC921DF3-1FB0-45DC-97EF-461960E13574}" type="datetime1">
               <a:rPr lang="en-US" smtClean="0"/>
-              <a:t>11/14/21</a:t>
+              <a:t>11/18/21</a:t>
             </a:fld>
             <a:endParaRPr lang="en-US"/>
           </a:p>
@@ -3335,7 +3335,7 @@
           <a:p>
             <a:fld id="{092B088E-2809-46D8-B43F-738015D878CC}" type="datetime1">
               <a:rPr lang="en-US" smtClean="0"/>
-              <a:t>11/14/21</a:t>
+              <a:t>11/18/21</a:t>
             </a:fld>
             <a:endParaRPr lang="en-US"/>
           </a:p>
@@ -3463,7 +3463,7 @@
           <a:p>
             <a:fld id="{8208D42A-BC08-426E-9E11-483BA9D61AF6}" type="datetime1">
               <a:rPr lang="en-US" smtClean="0"/>
-              <a:t>11/14/21</a:t>
+              <a:t>11/18/21</a:t>
             </a:fld>
             <a:endParaRPr lang="en-US"/>
           </a:p>
@@ -3596,7 +3596,7 @@
           <a:p>
             <a:fld id="{26B28102-2E91-4DD7-8E8B-98B790A12701}" type="datetime1">
               <a:rPr lang="en-US" smtClean="0"/>
-              <a:t>11/14/21</a:t>
+              <a:t>11/18/21</a:t>
             </a:fld>
             <a:endParaRPr lang="en-US"/>
           </a:p>
@@ -3692,7 +3692,7 @@
           <a:p>
             <a:fld id="{37D5C786-44E1-4BD5-AD14-75F3EA166B5A}" type="datetime1">
               <a:rPr lang="en-US" smtClean="0"/>
-              <a:t>11/14/21</a:t>
+              <a:t>11/18/21</a:t>
             </a:fld>
             <a:endParaRPr lang="en-US"/>
           </a:p>
@@ -3903,7 +3903,7 @@
           <a:p>
             <a:fld id="{26B28102-2E91-4DD7-8E8B-98B790A12701}" type="datetime1">
               <a:rPr lang="en-US" smtClean="0"/>
-              <a:t>11/14/21</a:t>
+              <a:t>11/18/21</a:t>
             </a:fld>
             <a:endParaRPr lang="en-US"/>
           </a:p>
@@ -6639,7 +6639,7 @@
           <a:noFill/>
           <a:extLst>
             <a:ext uri="{909E8E84-426E-40dd-AFC4-6F175D3DCCD1}">
-              <a14:hiddenFill xmlns:a14="http://schemas.microsoft.com/office/drawing/2010/main" xmlns="">
+              <a14:hiddenFill xmlns="" xmlns:a14="http://schemas.microsoft.com/office/drawing/2010/main">
                 <a:solidFill>
                   <a:srgbClr val="FFFFFF"/>
                 </a:solidFill>
@@ -17566,8 +17566,8 @@
           </a:p>
         </p:txBody>
       </p:sp>
-      <mc:AlternateContent xmlns:mc="http://schemas.openxmlformats.org/markup-compatibility/2006">
-        <mc:Choice xmlns:a14="http://schemas.microsoft.com/office/drawing/2010/main" Requires="a14">
+      <mc:AlternateContent xmlns:mc="http://schemas.openxmlformats.org/markup-compatibility/2006" xmlns:a14="http://schemas.microsoft.com/office/drawing/2010/main">
+        <mc:Choice Requires="a14">
           <p:sp>
             <p:nvSpPr>
               <p:cNvPr id="3" name="Content Placeholder 2">
@@ -17820,7 +17820,7 @@
             </p:txBody>
           </p:sp>
         </mc:Choice>
-        <mc:Fallback>
+        <mc:Fallback xmlns="">
           <p:sp>
             <p:nvSpPr>
               <p:cNvPr id="3" name="Content Placeholder 2">
@@ -18188,8 +18188,8 @@
           </a:p>
         </p:txBody>
       </p:sp>
-      <mc:AlternateContent xmlns:mc="http://schemas.openxmlformats.org/markup-compatibility/2006">
-        <mc:Choice xmlns:a14="http://schemas.microsoft.com/office/drawing/2010/main" Requires="a14">
+      <mc:AlternateContent xmlns:mc="http://schemas.openxmlformats.org/markup-compatibility/2006" xmlns:a14="http://schemas.microsoft.com/office/drawing/2010/main">
+        <mc:Choice Requires="a14">
           <p:sp>
             <p:nvSpPr>
               <p:cNvPr id="7" name="TextBox 6">
@@ -18256,7 +18256,7 @@
             </p:txBody>
           </p:sp>
         </mc:Choice>
-        <mc:Fallback>
+        <mc:Fallback xmlns="">
           <p:sp>
             <p:nvSpPr>
               <p:cNvPr id="7" name="TextBox 6">
@@ -22974,8 +22974,8 @@
           </a:p>
         </p:txBody>
       </p:sp>
-      <mc:AlternateContent xmlns:mc="http://schemas.openxmlformats.org/markup-compatibility/2006">
-        <mc:Choice xmlns:a14="http://schemas.microsoft.com/office/drawing/2010/main" Requires="a14">
+      <mc:AlternateContent xmlns:mc="http://schemas.openxmlformats.org/markup-compatibility/2006" xmlns:a14="http://schemas.microsoft.com/office/drawing/2010/main">
+        <mc:Choice Requires="a14">
           <p:sp>
             <p:nvSpPr>
               <p:cNvPr id="7" name="TextBox 6">
@@ -23042,7 +23042,7 @@
             </p:txBody>
           </p:sp>
         </mc:Choice>
-        <mc:Fallback>
+        <mc:Fallback xmlns="">
           <p:sp>
             <p:nvSpPr>
               <p:cNvPr id="7" name="TextBox 6">
@@ -28414,8 +28414,13 @@
             </a:pPr>
             <a:r>
               <a:rPr lang="en-US" sz="2800" dirty="0"/>
-              <a:t>Proof by contradiction, using weak duality property</a:t>
+              <a:t>Proof </a:t>
             </a:r>
+            <a:r>
+              <a:rPr lang="en-US" sz="2800"/>
+              <a:t>by contradiction</a:t>
+            </a:r>
+            <a:endParaRPr lang="en-US" sz="2800" dirty="0"/>
           </a:p>
           <a:p>
             <a:pPr marL="514350" indent="-457200"/>
@@ -38166,8 +38171,8 @@
           </a:p>
         </p:txBody>
       </p:sp>
-      <mc:AlternateContent xmlns:mc="http://schemas.openxmlformats.org/markup-compatibility/2006">
-        <mc:Choice xmlns:a14="http://schemas.microsoft.com/office/drawing/2010/main" Requires="a14">
+      <mc:AlternateContent xmlns:mc="http://schemas.openxmlformats.org/markup-compatibility/2006" xmlns:a14="http://schemas.microsoft.com/office/drawing/2010/main">
+        <mc:Choice Requires="a14">
           <p:sp>
             <p:nvSpPr>
               <p:cNvPr id="3" name="Content Placeholder 2"/>
@@ -38603,7 +38608,7 @@
             </p:txBody>
           </p:sp>
         </mc:Choice>
-        <mc:Fallback>
+        <mc:Fallback xmlns="">
           <p:sp>
             <p:nvSpPr>
               <p:cNvPr id="3" name="Content Placeholder 2"/>

</xml_diff>